<commit_message>
finish patterning and drawing, also seminar reflection
</commit_message>
<xml_diff>
--- a/Patterning and Drawing/3/AMA-數藝-對稱-4-4-相框-2024-0329.pptx
+++ b/Patterning and Drawing/3/AMA-數藝-對稱-4-4-相框-2024-0329.pptx
@@ -242,7 +242,7 @@
           <a:p>
             <a:fld id="{92313F0D-488C-4DE3-80EE-EEC414C806E8}" type="datetimeFigureOut">
               <a:rPr lang="zh-TW" altLang="en-US" smtClean="0"/>
-              <a:t>2024/10/11</a:t>
+              <a:t>2024/10/21</a:t>
             </a:fld>
             <a:endParaRPr lang="zh-TW" altLang="en-US"/>
           </a:p>
@@ -419,7 +419,7 @@
           <a:p>
             <a:fld id="{2A893153-C4CB-410B-B4DF-D0FC28D416FC}" type="datetimeFigureOut">
               <a:rPr lang="zh-TW" altLang="en-US" smtClean="0"/>
-              <a:t>2024/10/11</a:t>
+              <a:t>2024/10/21</a:t>
             </a:fld>
             <a:endParaRPr lang="zh-TW" altLang="en-US"/>
           </a:p>
@@ -815,7 +815,7 @@
           <a:p>
             <a:fld id="{4DEED613-C003-469C-8175-729B1F324B40}" type="datetime1">
               <a:rPr lang="zh-TW" altLang="en-US" smtClean="0"/>
-              <a:t>2024/10/11</a:t>
+              <a:t>2024/10/21</a:t>
             </a:fld>
             <a:endParaRPr lang="zh-TW" altLang="en-US"/>
           </a:p>
@@ -1137,7 +1137,7 @@
           <a:p>
             <a:fld id="{BC35621B-E3A9-4665-A441-919A01CC38DC}" type="datetime1">
               <a:rPr lang="zh-TW" altLang="en-US" smtClean="0"/>
-              <a:t>2024/10/11</a:t>
+              <a:t>2024/10/21</a:t>
             </a:fld>
             <a:endParaRPr lang="zh-TW" altLang="en-US"/>
           </a:p>
@@ -1343,7 +1343,7 @@
           <a:p>
             <a:fld id="{BC35621B-E3A9-4665-A441-919A01CC38DC}" type="datetime1">
               <a:rPr lang="zh-TW" altLang="en-US" smtClean="0"/>
-              <a:t>2024/10/11</a:t>
+              <a:t>2024/10/21</a:t>
             </a:fld>
             <a:endParaRPr lang="zh-TW" altLang="en-US"/>
           </a:p>
@@ -1611,7 +1611,7 @@
           <a:p>
             <a:fld id="{F82757DC-7520-4580-88A4-40D8EE36FCE9}" type="datetime1">
               <a:rPr lang="zh-TW" altLang="en-US" smtClean="0"/>
-              <a:t>2024/10/11</a:t>
+              <a:t>2024/10/21</a:t>
             </a:fld>
             <a:endParaRPr lang="zh-TW" altLang="en-US"/>
           </a:p>
@@ -1717,7 +1717,7 @@
           <a:p>
             <a:fld id="{45A5CFE9-10DB-4A24-90C1-E39457D7E8C3}" type="datetime1">
               <a:rPr lang="zh-TW" altLang="en-US" smtClean="0"/>
-              <a:t>2024/10/11</a:t>
+              <a:t>2024/10/21</a:t>
             </a:fld>
             <a:endParaRPr lang="zh-TW" altLang="en-US"/>
           </a:p>
@@ -1992,7 +1992,7 @@
           <a:p>
             <a:fld id="{92952076-DC45-4359-9BDE-F45A1493149A}" type="datetime1">
               <a:rPr lang="zh-TW" altLang="en-US" smtClean="0"/>
-              <a:t>2024/10/11</a:t>
+              <a:t>2024/10/21</a:t>
             </a:fld>
             <a:endParaRPr lang="zh-TW" altLang="en-US"/>
           </a:p>
@@ -2247,7 +2247,7 @@
           <a:p>
             <a:fld id="{FC5E6872-CCB5-4B0D-A316-DB5C24D217B2}" type="datetime1">
               <a:rPr lang="zh-TW" altLang="en-US" smtClean="0"/>
-              <a:t>2024/10/11</a:t>
+              <a:t>2024/10/21</a:t>
             </a:fld>
             <a:endParaRPr lang="zh-TW" altLang="en-US"/>
           </a:p>
@@ -2420,7 +2420,7 @@
           <a:p>
             <a:fld id="{7A5C97B7-A7D6-4D3B-9815-89A5EF07ABC5}" type="datetime1">
               <a:rPr lang="zh-TW" altLang="en-US" smtClean="0"/>
-              <a:t>2024/10/11</a:t>
+              <a:t>2024/10/21</a:t>
             </a:fld>
             <a:endParaRPr lang="zh-TW" altLang="en-US"/>
           </a:p>
@@ -2599,7 +2599,7 @@
           <a:p>
             <a:fld id="{270AF981-5787-47B4-AB02-0CCF7E25FFE9}" type="datetime1">
               <a:rPr lang="zh-TW" altLang="en-US" smtClean="0"/>
-              <a:t>2024/10/11</a:t>
+              <a:t>2024/10/21</a:t>
             </a:fld>
             <a:endParaRPr lang="zh-TW" altLang="en-US"/>
           </a:p>
@@ -2792,7 +2792,7 @@
           <a:p>
             <a:fld id="{9BE1D5D5-824B-4DB9-81C2-B220A359DBEC}" type="datetime1">
               <a:rPr lang="zh-TW" altLang="en-US" smtClean="0"/>
-              <a:t>2024/10/11</a:t>
+              <a:t>2024/10/21</a:t>
             </a:fld>
             <a:endParaRPr lang="zh-TW" altLang="en-US"/>
           </a:p>
@@ -2965,7 +2965,7 @@
           <a:p>
             <a:fld id="{A5745355-D0B1-4A58-800A-D2CC9D3972DE}" type="datetime1">
               <a:rPr lang="zh-TW" altLang="en-US" smtClean="0"/>
-              <a:t>2024/10/11</a:t>
+              <a:t>2024/10/21</a:t>
             </a:fld>
             <a:endParaRPr lang="zh-TW" altLang="en-US"/>
           </a:p>
@@ -3210,7 +3210,7 @@
           <a:p>
             <a:fld id="{744F186C-F5D4-4078-BFA3-847DF05C6AFB}" type="datetime1">
               <a:rPr lang="zh-TW" altLang="en-US" smtClean="0"/>
-              <a:t>2024/10/11</a:t>
+              <a:t>2024/10/21</a:t>
             </a:fld>
             <a:endParaRPr lang="zh-TW" altLang="en-US"/>
           </a:p>
@@ -3439,7 +3439,7 @@
           <a:p>
             <a:fld id="{66B0BA5D-AFF5-41E7-8802-5889342747D2}" type="datetime1">
               <a:rPr lang="zh-TW" altLang="en-US" smtClean="0"/>
-              <a:t>2024/10/11</a:t>
+              <a:t>2024/10/21</a:t>
             </a:fld>
             <a:endParaRPr lang="zh-TW" altLang="en-US"/>
           </a:p>
@@ -3804,7 +3804,7 @@
           <a:p>
             <a:fld id="{5955FD4D-9362-47FD-B99B-1A88791E268A}" type="datetime1">
               <a:rPr lang="zh-TW" altLang="en-US" smtClean="0"/>
-              <a:t>2024/10/11</a:t>
+              <a:t>2024/10/21</a:t>
             </a:fld>
             <a:endParaRPr lang="zh-TW" altLang="en-US"/>
           </a:p>
@@ -3954,7 +3954,7 @@
           <a:p>
             <a:fld id="{F649BE75-ABB9-42EE-9D57-66CE6CE723AD}" type="datetime1">
               <a:rPr lang="zh-TW" altLang="en-US" smtClean="0"/>
-              <a:t>2024/10/11</a:t>
+              <a:t>2024/10/21</a:t>
             </a:fld>
             <a:endParaRPr lang="zh-TW" altLang="en-US"/>
           </a:p>
@@ -4202,7 +4202,7 @@
           <a:p>
             <a:fld id="{F649BE75-ABB9-42EE-9D57-66CE6CE723AD}" type="datetime1">
               <a:rPr lang="zh-TW" altLang="en-US" smtClean="0"/>
-              <a:t>2024/10/11</a:t>
+              <a:t>2024/10/21</a:t>
             </a:fld>
             <a:endParaRPr lang="zh-TW" altLang="en-US"/>
           </a:p>
@@ -4487,7 +4487,7 @@
           <a:p>
             <a:fld id="{F649BE75-ABB9-42EE-9D57-66CE6CE723AD}" type="datetime1">
               <a:rPr lang="zh-TW" altLang="en-US" smtClean="0"/>
-              <a:t>2024/10/11</a:t>
+              <a:t>2024/10/21</a:t>
             </a:fld>
             <a:endParaRPr lang="zh-TW" altLang="en-US"/>
           </a:p>
@@ -4847,7 +4847,7 @@
           <a:p>
             <a:fld id="{FB1F19E3-8BD2-496F-B6DB-820524D582AC}" type="datetime1">
               <a:rPr lang="zh-TW" altLang="en-US" smtClean="0"/>
-              <a:t>2024/10/11</a:t>
+              <a:t>2024/10/21</a:t>
             </a:fld>
             <a:endParaRPr lang="zh-TW" altLang="en-US"/>
           </a:p>
@@ -5762,64 +5762,12 @@
           </a:p>
         </p:txBody>
       </p:sp>
-      <p:pic>
-        <p:nvPicPr>
-          <p:cNvPr id="2" name="圖片 1">
+      <p:grpSp>
+        <p:nvGrpSpPr>
+          <p:cNvPr id="9" name="群組 8">
             <a:extLst>
               <a:ext uri="{FF2B5EF4-FFF2-40B4-BE49-F238E27FC236}">
-                <a16:creationId xmlns:a16="http://schemas.microsoft.com/office/drawing/2014/main" id="{59267933-A176-5BA5-97A6-8DD831C658F1}"/>
-              </a:ext>
-            </a:extLst>
-          </p:cNvPr>
-          <p:cNvPicPr>
-            <a:picLocks/>
-          </p:cNvPicPr>
-          <p:nvPr/>
-        </p:nvPicPr>
-        <p:blipFill>
-          <a:blip r:embed="rId4">
-            <a:duotone>
-              <a:schemeClr val="accent5">
-                <a:shade val="45000"/>
-                <a:satMod val="135000"/>
-              </a:schemeClr>
-              <a:prstClr val="white"/>
-            </a:duotone>
-          </a:blip>
-          <a:stretch>
-            <a:fillRect/>
-          </a:stretch>
-        </p:blipFill>
-        <p:spPr>
-          <a:xfrm>
-            <a:off x="6716484" y="1175659"/>
-            <a:ext cx="4633362" cy="4633362"/>
-          </a:xfrm>
-          <a:prstGeom prst="rect">
-            <a:avLst/>
-          </a:prstGeom>
-          <a:ln w="38100" cap="sq">
-            <a:solidFill>
-              <a:srgbClr val="000000"/>
-            </a:solidFill>
-            <a:prstDash val="solid"/>
-            <a:miter lim="800000"/>
-          </a:ln>
-          <a:effectLst>
-            <a:outerShdw blurRad="50800" dist="38100" dir="2700000" algn="tl" rotWithShape="0">
-              <a:srgbClr val="000000">
-                <a:alpha val="43000"/>
-              </a:srgbClr>
-            </a:outerShdw>
-          </a:effectLst>
-        </p:spPr>
-      </p:pic>
-      <p:grpSp>
-        <p:nvGrpSpPr>
-          <p:cNvPr id="6" name="群組 5">
-            <a:extLst>
-              <a:ext uri="{FF2B5EF4-FFF2-40B4-BE49-F238E27FC236}">
-                <a16:creationId xmlns:a16="http://schemas.microsoft.com/office/drawing/2014/main" id="{03D7EFE0-3757-29B1-3EE5-E34660100361}"/>
+                <a16:creationId xmlns:a16="http://schemas.microsoft.com/office/drawing/2014/main" id="{55C12EDE-8FAB-A1EA-16BC-1ACDD578E593}"/>
               </a:ext>
             </a:extLst>
           </p:cNvPr>
@@ -5828,18 +5776,18 @@
         </p:nvGrpSpPr>
         <p:grpSpPr>
           <a:xfrm>
-            <a:off x="7358744" y="1844842"/>
-            <a:ext cx="3300882" cy="3293215"/>
-            <a:chOff x="6546466" y="860888"/>
-            <a:chExt cx="5249111" cy="5236918"/>
+            <a:off x="6716484" y="1175659"/>
+            <a:ext cx="4633362" cy="4633362"/>
+            <a:chOff x="6716484" y="1175659"/>
+            <a:chExt cx="4633362" cy="4633362"/>
           </a:xfrm>
         </p:grpSpPr>
         <p:pic>
           <p:nvPicPr>
-            <p:cNvPr id="7" name="圖片 6">
+            <p:cNvPr id="2" name="圖片 1">
               <a:extLst>
                 <a:ext uri="{FF2B5EF4-FFF2-40B4-BE49-F238E27FC236}">
-                  <a16:creationId xmlns:a16="http://schemas.microsoft.com/office/drawing/2014/main" id="{16AE2C48-08BE-AB2B-4116-D700DD30C93A}"/>
+                  <a16:creationId xmlns:a16="http://schemas.microsoft.com/office/drawing/2014/main" id="{59267933-A176-5BA5-97A6-8DD831C658F1}"/>
                 </a:ext>
               </a:extLst>
             </p:cNvPr>
@@ -5849,145 +5797,7 @@
             <p:nvPr/>
           </p:nvPicPr>
           <p:blipFill>
-            <a:blip r:embed="rId5">
-              <a:duotone>
-                <a:schemeClr val="accent4">
-                  <a:shade val="45000"/>
-                  <a:satMod val="135000"/>
-                </a:schemeClr>
-                <a:prstClr val="white"/>
-              </a:duotone>
-            </a:blip>
-            <a:srcRect l="5935" t="5595" r="9868" b="10012"/>
-            <a:stretch>
-              <a:fillRect/>
-            </a:stretch>
-          </p:blipFill>
-          <p:spPr>
-            <a:xfrm>
-              <a:off x="6858006" y="1153884"/>
-              <a:ext cx="4419591" cy="4419590"/>
-            </a:xfrm>
-            <a:custGeom>
-              <a:avLst/>
-              <a:gdLst>
-                <a:gd name="connsiteX0" fmla="*/ 2209796 w 4419591"/>
-                <a:gd name="connsiteY0" fmla="*/ 0 h 4419590"/>
-                <a:gd name="connsiteX1" fmla="*/ 2731449 w 4419591"/>
-                <a:gd name="connsiteY1" fmla="*/ 1688145 h 4419590"/>
-                <a:gd name="connsiteX2" fmla="*/ 4419591 w 4419591"/>
-                <a:gd name="connsiteY2" fmla="*/ 1688133 h 4419590"/>
-                <a:gd name="connsiteX3" fmla="*/ 3053849 w 4419591"/>
-                <a:gd name="connsiteY3" fmla="*/ 2731452 h 4419590"/>
-                <a:gd name="connsiteX4" fmla="*/ 3575524 w 4419591"/>
-                <a:gd name="connsiteY4" fmla="*/ 4419590 h 4419590"/>
-                <a:gd name="connsiteX5" fmla="*/ 2209796 w 4419591"/>
-                <a:gd name="connsiteY5" fmla="*/ 3376251 h 4419590"/>
-                <a:gd name="connsiteX6" fmla="*/ 844067 w 4419591"/>
-                <a:gd name="connsiteY6" fmla="*/ 4419590 h 4419590"/>
-                <a:gd name="connsiteX7" fmla="*/ 1365742 w 4419591"/>
-                <a:gd name="connsiteY7" fmla="*/ 2731452 h 4419590"/>
-                <a:gd name="connsiteX8" fmla="*/ 0 w 4419591"/>
-                <a:gd name="connsiteY8" fmla="*/ 1688133 h 4419590"/>
-                <a:gd name="connsiteX9" fmla="*/ 1688142 w 4419591"/>
-                <a:gd name="connsiteY9" fmla="*/ 1688145 h 4419590"/>
-                <a:gd name="connsiteX10" fmla="*/ 2209796 w 4419591"/>
-                <a:gd name="connsiteY10" fmla="*/ 0 h 4419590"/>
-              </a:gdLst>
-              <a:ahLst/>
-              <a:cxnLst>
-                <a:cxn ang="0">
-                  <a:pos x="connsiteX0" y="connsiteY0"/>
-                </a:cxn>
-                <a:cxn ang="0">
-                  <a:pos x="connsiteX1" y="connsiteY1"/>
-                </a:cxn>
-                <a:cxn ang="0">
-                  <a:pos x="connsiteX2" y="connsiteY2"/>
-                </a:cxn>
-                <a:cxn ang="0">
-                  <a:pos x="connsiteX3" y="connsiteY3"/>
-                </a:cxn>
-                <a:cxn ang="0">
-                  <a:pos x="connsiteX4" y="connsiteY4"/>
-                </a:cxn>
-                <a:cxn ang="0">
-                  <a:pos x="connsiteX5" y="connsiteY5"/>
-                </a:cxn>
-                <a:cxn ang="0">
-                  <a:pos x="connsiteX6" y="connsiteY6"/>
-                </a:cxn>
-                <a:cxn ang="0">
-                  <a:pos x="connsiteX7" y="connsiteY7"/>
-                </a:cxn>
-                <a:cxn ang="0">
-                  <a:pos x="connsiteX8" y="connsiteY8"/>
-                </a:cxn>
-                <a:cxn ang="0">
-                  <a:pos x="connsiteX9" y="connsiteY9"/>
-                </a:cxn>
-                <a:cxn ang="0">
-                  <a:pos x="connsiteX10" y="connsiteY10"/>
-                </a:cxn>
-              </a:cxnLst>
-              <a:rect l="l" t="t" r="r" b="b"/>
-              <a:pathLst>
-                <a:path w="4419591" h="4419590">
-                  <a:moveTo>
-                    <a:pt x="2209796" y="0"/>
-                  </a:moveTo>
-                  <a:lnTo>
-                    <a:pt x="2731449" y="1688145"/>
-                  </a:lnTo>
-                  <a:lnTo>
-                    <a:pt x="4419591" y="1688133"/>
-                  </a:lnTo>
-                  <a:lnTo>
-                    <a:pt x="3053849" y="2731452"/>
-                  </a:lnTo>
-                  <a:lnTo>
-                    <a:pt x="3575524" y="4419590"/>
-                  </a:lnTo>
-                  <a:lnTo>
-                    <a:pt x="2209796" y="3376251"/>
-                  </a:lnTo>
-                  <a:lnTo>
-                    <a:pt x="844067" y="4419590"/>
-                  </a:lnTo>
-                  <a:lnTo>
-                    <a:pt x="1365742" y="2731452"/>
-                  </a:lnTo>
-                  <a:lnTo>
-                    <a:pt x="0" y="1688133"/>
-                  </a:lnTo>
-                  <a:lnTo>
-                    <a:pt x="1688142" y="1688145"/>
-                  </a:lnTo>
-                  <a:lnTo>
-                    <a:pt x="2209796" y="0"/>
-                  </a:lnTo>
-                  <a:close/>
-                </a:path>
-              </a:pathLst>
-            </a:custGeom>
-          </p:spPr>
-        </p:pic>
-        <p:pic>
-          <p:nvPicPr>
-            <p:cNvPr id="8" name="圖片 7">
-              <a:extLst>
-                <a:ext uri="{FF2B5EF4-FFF2-40B4-BE49-F238E27FC236}">
-                  <a16:creationId xmlns:a16="http://schemas.microsoft.com/office/drawing/2014/main" id="{275CEDC5-7F21-D9A9-19EE-82EAF0CE401F}"/>
-                </a:ext>
-              </a:extLst>
-            </p:cNvPr>
-            <p:cNvPicPr>
-              <a:picLocks/>
-            </p:cNvPicPr>
-            <p:nvPr/>
-          </p:nvPicPr>
-          <p:blipFill>
-            <a:blip r:embed="rId5">
+            <a:blip r:embed="rId4">
               <a:duotone>
                 <a:schemeClr val="accent5">
                   <a:shade val="45000"/>
@@ -5996,161 +5806,372 @@
                 <a:prstClr val="white"/>
               </a:duotone>
             </a:blip>
-            <a:srcRect/>
             <a:stretch>
               <a:fillRect/>
             </a:stretch>
           </p:blipFill>
           <p:spPr>
             <a:xfrm>
-              <a:off x="6546466" y="860888"/>
-              <a:ext cx="5249111" cy="5236918"/>
+              <a:off x="6716484" y="1175659"/>
+              <a:ext cx="4633362" cy="4633362"/>
             </a:xfrm>
-            <a:custGeom>
+            <a:prstGeom prst="rect">
               <a:avLst/>
-              <a:gdLst>
-                <a:gd name="connsiteX0" fmla="*/ 0 w 5249111"/>
-                <a:gd name="connsiteY0" fmla="*/ 0 h 5236918"/>
-                <a:gd name="connsiteX1" fmla="*/ 5249111 w 5249111"/>
-                <a:gd name="connsiteY1" fmla="*/ 0 h 5236918"/>
-                <a:gd name="connsiteX2" fmla="*/ 5249111 w 5249111"/>
-                <a:gd name="connsiteY2" fmla="*/ 5236918 h 5236918"/>
-                <a:gd name="connsiteX3" fmla="*/ 0 w 5249111"/>
-                <a:gd name="connsiteY3" fmla="*/ 5236918 h 5236918"/>
-                <a:gd name="connsiteX4" fmla="*/ 0 w 5249111"/>
-                <a:gd name="connsiteY4" fmla="*/ 0 h 5236918"/>
-                <a:gd name="connsiteX5" fmla="*/ 2521335 w 5249111"/>
-                <a:gd name="connsiteY5" fmla="*/ 292996 h 5236918"/>
-                <a:gd name="connsiteX6" fmla="*/ 1999681 w 5249111"/>
-                <a:gd name="connsiteY6" fmla="*/ 1981141 h 5236918"/>
-                <a:gd name="connsiteX7" fmla="*/ 311539 w 5249111"/>
-                <a:gd name="connsiteY7" fmla="*/ 1981129 h 5236918"/>
-                <a:gd name="connsiteX8" fmla="*/ 1677281 w 5249111"/>
-                <a:gd name="connsiteY8" fmla="*/ 3024448 h 5236918"/>
-                <a:gd name="connsiteX9" fmla="*/ 1155606 w 5249111"/>
-                <a:gd name="connsiteY9" fmla="*/ 4712586 h 5236918"/>
-                <a:gd name="connsiteX10" fmla="*/ 2521335 w 5249111"/>
-                <a:gd name="connsiteY10" fmla="*/ 3669247 h 5236918"/>
-                <a:gd name="connsiteX11" fmla="*/ 3887063 w 5249111"/>
-                <a:gd name="connsiteY11" fmla="*/ 4712586 h 5236918"/>
-                <a:gd name="connsiteX12" fmla="*/ 3365388 w 5249111"/>
-                <a:gd name="connsiteY12" fmla="*/ 3024448 h 5236918"/>
-                <a:gd name="connsiteX13" fmla="*/ 4731130 w 5249111"/>
-                <a:gd name="connsiteY13" fmla="*/ 1981129 h 5236918"/>
-                <a:gd name="connsiteX14" fmla="*/ 3042988 w 5249111"/>
-                <a:gd name="connsiteY14" fmla="*/ 1981141 h 5236918"/>
-                <a:gd name="connsiteX15" fmla="*/ 2521335 w 5249111"/>
-                <a:gd name="connsiteY15" fmla="*/ 292996 h 5236918"/>
-              </a:gdLst>
-              <a:ahLst/>
-              <a:cxnLst>
-                <a:cxn ang="0">
-                  <a:pos x="connsiteX0" y="connsiteY0"/>
-                </a:cxn>
-                <a:cxn ang="0">
-                  <a:pos x="connsiteX1" y="connsiteY1"/>
-                </a:cxn>
-                <a:cxn ang="0">
-                  <a:pos x="connsiteX2" y="connsiteY2"/>
-                </a:cxn>
-                <a:cxn ang="0">
-                  <a:pos x="connsiteX3" y="connsiteY3"/>
-                </a:cxn>
-                <a:cxn ang="0">
-                  <a:pos x="connsiteX4" y="connsiteY4"/>
-                </a:cxn>
-                <a:cxn ang="0">
-                  <a:pos x="connsiteX5" y="connsiteY5"/>
-                </a:cxn>
-                <a:cxn ang="0">
-                  <a:pos x="connsiteX6" y="connsiteY6"/>
-                </a:cxn>
-                <a:cxn ang="0">
-                  <a:pos x="connsiteX7" y="connsiteY7"/>
-                </a:cxn>
-                <a:cxn ang="0">
-                  <a:pos x="connsiteX8" y="connsiteY8"/>
-                </a:cxn>
-                <a:cxn ang="0">
-                  <a:pos x="connsiteX9" y="connsiteY9"/>
-                </a:cxn>
-                <a:cxn ang="0">
-                  <a:pos x="connsiteX10" y="connsiteY10"/>
-                </a:cxn>
-                <a:cxn ang="0">
-                  <a:pos x="connsiteX11" y="connsiteY11"/>
-                </a:cxn>
-                <a:cxn ang="0">
-                  <a:pos x="connsiteX12" y="connsiteY12"/>
-                </a:cxn>
-                <a:cxn ang="0">
-                  <a:pos x="connsiteX13" y="connsiteY13"/>
-                </a:cxn>
-                <a:cxn ang="0">
-                  <a:pos x="connsiteX14" y="connsiteY14"/>
-                </a:cxn>
-                <a:cxn ang="0">
-                  <a:pos x="connsiteX15" y="connsiteY15"/>
-                </a:cxn>
-              </a:cxnLst>
-              <a:rect l="l" t="t" r="r" b="b"/>
-              <a:pathLst>
-                <a:path w="5249111" h="5236918">
-                  <a:moveTo>
-                    <a:pt x="0" y="0"/>
-                  </a:moveTo>
-                  <a:lnTo>
-                    <a:pt x="5249111" y="0"/>
-                  </a:lnTo>
-                  <a:lnTo>
-                    <a:pt x="5249111" y="5236918"/>
-                  </a:lnTo>
-                  <a:lnTo>
-                    <a:pt x="0" y="5236918"/>
-                  </a:lnTo>
-                  <a:lnTo>
-                    <a:pt x="0" y="0"/>
-                  </a:lnTo>
-                  <a:close/>
-                  <a:moveTo>
-                    <a:pt x="2521335" y="292996"/>
-                  </a:moveTo>
-                  <a:lnTo>
-                    <a:pt x="1999681" y="1981141"/>
-                  </a:lnTo>
-                  <a:lnTo>
-                    <a:pt x="311539" y="1981129"/>
-                  </a:lnTo>
-                  <a:lnTo>
-                    <a:pt x="1677281" y="3024448"/>
-                  </a:lnTo>
-                  <a:lnTo>
-                    <a:pt x="1155606" y="4712586"/>
-                  </a:lnTo>
-                  <a:lnTo>
-                    <a:pt x="2521335" y="3669247"/>
-                  </a:lnTo>
-                  <a:lnTo>
-                    <a:pt x="3887063" y="4712586"/>
-                  </a:lnTo>
-                  <a:lnTo>
-                    <a:pt x="3365388" y="3024448"/>
-                  </a:lnTo>
-                  <a:lnTo>
-                    <a:pt x="4731130" y="1981129"/>
-                  </a:lnTo>
-                  <a:lnTo>
-                    <a:pt x="3042988" y="1981141"/>
-                  </a:lnTo>
-                  <a:lnTo>
-                    <a:pt x="2521335" y="292996"/>
-                  </a:lnTo>
-                  <a:close/>
-                </a:path>
-              </a:pathLst>
-            </a:custGeom>
+            </a:prstGeom>
+            <a:ln w="38100" cap="sq">
+              <a:solidFill>
+                <a:srgbClr val="000000"/>
+              </a:solidFill>
+              <a:prstDash val="solid"/>
+              <a:miter lim="800000"/>
+            </a:ln>
+            <a:effectLst>
+              <a:outerShdw blurRad="50800" dist="38100" dir="2700000" algn="tl" rotWithShape="0">
+                <a:srgbClr val="000000">
+                  <a:alpha val="43000"/>
+                </a:srgbClr>
+              </a:outerShdw>
+            </a:effectLst>
           </p:spPr>
         </p:pic>
+        <p:grpSp>
+          <p:nvGrpSpPr>
+            <p:cNvPr id="6" name="群組 5">
+              <a:extLst>
+                <a:ext uri="{FF2B5EF4-FFF2-40B4-BE49-F238E27FC236}">
+                  <a16:creationId xmlns:a16="http://schemas.microsoft.com/office/drawing/2014/main" id="{03D7EFE0-3757-29B1-3EE5-E34660100361}"/>
+                </a:ext>
+              </a:extLst>
+            </p:cNvPr>
+            <p:cNvGrpSpPr/>
+            <p:nvPr/>
+          </p:nvGrpSpPr>
+          <p:grpSpPr>
+            <a:xfrm>
+              <a:off x="7358744" y="1844842"/>
+              <a:ext cx="3300882" cy="3293215"/>
+              <a:chOff x="6546466" y="860888"/>
+              <a:chExt cx="5249111" cy="5236918"/>
+            </a:xfrm>
+          </p:grpSpPr>
+          <p:pic>
+            <p:nvPicPr>
+              <p:cNvPr id="7" name="圖片 6">
+                <a:extLst>
+                  <a:ext uri="{FF2B5EF4-FFF2-40B4-BE49-F238E27FC236}">
+                    <a16:creationId xmlns:a16="http://schemas.microsoft.com/office/drawing/2014/main" id="{16AE2C48-08BE-AB2B-4116-D700DD30C93A}"/>
+                  </a:ext>
+                </a:extLst>
+              </p:cNvPr>
+              <p:cNvPicPr>
+                <a:picLocks/>
+              </p:cNvPicPr>
+              <p:nvPr/>
+            </p:nvPicPr>
+            <p:blipFill>
+              <a:blip r:embed="rId5">
+                <a:duotone>
+                  <a:schemeClr val="accent4">
+                    <a:shade val="45000"/>
+                    <a:satMod val="135000"/>
+                  </a:schemeClr>
+                  <a:prstClr val="white"/>
+                </a:duotone>
+              </a:blip>
+              <a:srcRect l="5935" t="5595" r="9868" b="10012"/>
+              <a:stretch>
+                <a:fillRect/>
+              </a:stretch>
+            </p:blipFill>
+            <p:spPr>
+              <a:xfrm>
+                <a:off x="6858006" y="1153884"/>
+                <a:ext cx="4419591" cy="4419590"/>
+              </a:xfrm>
+              <a:custGeom>
+                <a:avLst/>
+                <a:gdLst>
+                  <a:gd name="connsiteX0" fmla="*/ 2209796 w 4419591"/>
+                  <a:gd name="connsiteY0" fmla="*/ 0 h 4419590"/>
+                  <a:gd name="connsiteX1" fmla="*/ 2731449 w 4419591"/>
+                  <a:gd name="connsiteY1" fmla="*/ 1688145 h 4419590"/>
+                  <a:gd name="connsiteX2" fmla="*/ 4419591 w 4419591"/>
+                  <a:gd name="connsiteY2" fmla="*/ 1688133 h 4419590"/>
+                  <a:gd name="connsiteX3" fmla="*/ 3053849 w 4419591"/>
+                  <a:gd name="connsiteY3" fmla="*/ 2731452 h 4419590"/>
+                  <a:gd name="connsiteX4" fmla="*/ 3575524 w 4419591"/>
+                  <a:gd name="connsiteY4" fmla="*/ 4419590 h 4419590"/>
+                  <a:gd name="connsiteX5" fmla="*/ 2209796 w 4419591"/>
+                  <a:gd name="connsiteY5" fmla="*/ 3376251 h 4419590"/>
+                  <a:gd name="connsiteX6" fmla="*/ 844067 w 4419591"/>
+                  <a:gd name="connsiteY6" fmla="*/ 4419590 h 4419590"/>
+                  <a:gd name="connsiteX7" fmla="*/ 1365742 w 4419591"/>
+                  <a:gd name="connsiteY7" fmla="*/ 2731452 h 4419590"/>
+                  <a:gd name="connsiteX8" fmla="*/ 0 w 4419591"/>
+                  <a:gd name="connsiteY8" fmla="*/ 1688133 h 4419590"/>
+                  <a:gd name="connsiteX9" fmla="*/ 1688142 w 4419591"/>
+                  <a:gd name="connsiteY9" fmla="*/ 1688145 h 4419590"/>
+                  <a:gd name="connsiteX10" fmla="*/ 2209796 w 4419591"/>
+                  <a:gd name="connsiteY10" fmla="*/ 0 h 4419590"/>
+                </a:gdLst>
+                <a:ahLst/>
+                <a:cxnLst>
+                  <a:cxn ang="0">
+                    <a:pos x="connsiteX0" y="connsiteY0"/>
+                  </a:cxn>
+                  <a:cxn ang="0">
+                    <a:pos x="connsiteX1" y="connsiteY1"/>
+                  </a:cxn>
+                  <a:cxn ang="0">
+                    <a:pos x="connsiteX2" y="connsiteY2"/>
+                  </a:cxn>
+                  <a:cxn ang="0">
+                    <a:pos x="connsiteX3" y="connsiteY3"/>
+                  </a:cxn>
+                  <a:cxn ang="0">
+                    <a:pos x="connsiteX4" y="connsiteY4"/>
+                  </a:cxn>
+                  <a:cxn ang="0">
+                    <a:pos x="connsiteX5" y="connsiteY5"/>
+                  </a:cxn>
+                  <a:cxn ang="0">
+                    <a:pos x="connsiteX6" y="connsiteY6"/>
+                  </a:cxn>
+                  <a:cxn ang="0">
+                    <a:pos x="connsiteX7" y="connsiteY7"/>
+                  </a:cxn>
+                  <a:cxn ang="0">
+                    <a:pos x="connsiteX8" y="connsiteY8"/>
+                  </a:cxn>
+                  <a:cxn ang="0">
+                    <a:pos x="connsiteX9" y="connsiteY9"/>
+                  </a:cxn>
+                  <a:cxn ang="0">
+                    <a:pos x="connsiteX10" y="connsiteY10"/>
+                  </a:cxn>
+                </a:cxnLst>
+                <a:rect l="l" t="t" r="r" b="b"/>
+                <a:pathLst>
+                  <a:path w="4419591" h="4419590">
+                    <a:moveTo>
+                      <a:pt x="2209796" y="0"/>
+                    </a:moveTo>
+                    <a:lnTo>
+                      <a:pt x="2731449" y="1688145"/>
+                    </a:lnTo>
+                    <a:lnTo>
+                      <a:pt x="4419591" y="1688133"/>
+                    </a:lnTo>
+                    <a:lnTo>
+                      <a:pt x="3053849" y="2731452"/>
+                    </a:lnTo>
+                    <a:lnTo>
+                      <a:pt x="3575524" y="4419590"/>
+                    </a:lnTo>
+                    <a:lnTo>
+                      <a:pt x="2209796" y="3376251"/>
+                    </a:lnTo>
+                    <a:lnTo>
+                      <a:pt x="844067" y="4419590"/>
+                    </a:lnTo>
+                    <a:lnTo>
+                      <a:pt x="1365742" y="2731452"/>
+                    </a:lnTo>
+                    <a:lnTo>
+                      <a:pt x="0" y="1688133"/>
+                    </a:lnTo>
+                    <a:lnTo>
+                      <a:pt x="1688142" y="1688145"/>
+                    </a:lnTo>
+                    <a:lnTo>
+                      <a:pt x="2209796" y="0"/>
+                    </a:lnTo>
+                    <a:close/>
+                  </a:path>
+                </a:pathLst>
+              </a:custGeom>
+            </p:spPr>
+          </p:pic>
+          <p:pic>
+            <p:nvPicPr>
+              <p:cNvPr id="8" name="圖片 7">
+                <a:extLst>
+                  <a:ext uri="{FF2B5EF4-FFF2-40B4-BE49-F238E27FC236}">
+                    <a16:creationId xmlns:a16="http://schemas.microsoft.com/office/drawing/2014/main" id="{275CEDC5-7F21-D9A9-19EE-82EAF0CE401F}"/>
+                  </a:ext>
+                </a:extLst>
+              </p:cNvPr>
+              <p:cNvPicPr>
+                <a:picLocks/>
+              </p:cNvPicPr>
+              <p:nvPr/>
+            </p:nvPicPr>
+            <p:blipFill>
+              <a:blip r:embed="rId5">
+                <a:duotone>
+                  <a:schemeClr val="accent5">
+                    <a:shade val="45000"/>
+                    <a:satMod val="135000"/>
+                  </a:schemeClr>
+                  <a:prstClr val="white"/>
+                </a:duotone>
+              </a:blip>
+              <a:srcRect/>
+              <a:stretch>
+                <a:fillRect/>
+              </a:stretch>
+            </p:blipFill>
+            <p:spPr>
+              <a:xfrm>
+                <a:off x="6546466" y="860888"/>
+                <a:ext cx="5249111" cy="5236918"/>
+              </a:xfrm>
+              <a:custGeom>
+                <a:avLst/>
+                <a:gdLst>
+                  <a:gd name="connsiteX0" fmla="*/ 0 w 5249111"/>
+                  <a:gd name="connsiteY0" fmla="*/ 0 h 5236918"/>
+                  <a:gd name="connsiteX1" fmla="*/ 5249111 w 5249111"/>
+                  <a:gd name="connsiteY1" fmla="*/ 0 h 5236918"/>
+                  <a:gd name="connsiteX2" fmla="*/ 5249111 w 5249111"/>
+                  <a:gd name="connsiteY2" fmla="*/ 5236918 h 5236918"/>
+                  <a:gd name="connsiteX3" fmla="*/ 0 w 5249111"/>
+                  <a:gd name="connsiteY3" fmla="*/ 5236918 h 5236918"/>
+                  <a:gd name="connsiteX4" fmla="*/ 0 w 5249111"/>
+                  <a:gd name="connsiteY4" fmla="*/ 0 h 5236918"/>
+                  <a:gd name="connsiteX5" fmla="*/ 2521335 w 5249111"/>
+                  <a:gd name="connsiteY5" fmla="*/ 292996 h 5236918"/>
+                  <a:gd name="connsiteX6" fmla="*/ 1999681 w 5249111"/>
+                  <a:gd name="connsiteY6" fmla="*/ 1981141 h 5236918"/>
+                  <a:gd name="connsiteX7" fmla="*/ 311539 w 5249111"/>
+                  <a:gd name="connsiteY7" fmla="*/ 1981129 h 5236918"/>
+                  <a:gd name="connsiteX8" fmla="*/ 1677281 w 5249111"/>
+                  <a:gd name="connsiteY8" fmla="*/ 3024448 h 5236918"/>
+                  <a:gd name="connsiteX9" fmla="*/ 1155606 w 5249111"/>
+                  <a:gd name="connsiteY9" fmla="*/ 4712586 h 5236918"/>
+                  <a:gd name="connsiteX10" fmla="*/ 2521335 w 5249111"/>
+                  <a:gd name="connsiteY10" fmla="*/ 3669247 h 5236918"/>
+                  <a:gd name="connsiteX11" fmla="*/ 3887063 w 5249111"/>
+                  <a:gd name="connsiteY11" fmla="*/ 4712586 h 5236918"/>
+                  <a:gd name="connsiteX12" fmla="*/ 3365388 w 5249111"/>
+                  <a:gd name="connsiteY12" fmla="*/ 3024448 h 5236918"/>
+                  <a:gd name="connsiteX13" fmla="*/ 4731130 w 5249111"/>
+                  <a:gd name="connsiteY13" fmla="*/ 1981129 h 5236918"/>
+                  <a:gd name="connsiteX14" fmla="*/ 3042988 w 5249111"/>
+                  <a:gd name="connsiteY14" fmla="*/ 1981141 h 5236918"/>
+                  <a:gd name="connsiteX15" fmla="*/ 2521335 w 5249111"/>
+                  <a:gd name="connsiteY15" fmla="*/ 292996 h 5236918"/>
+                </a:gdLst>
+                <a:ahLst/>
+                <a:cxnLst>
+                  <a:cxn ang="0">
+                    <a:pos x="connsiteX0" y="connsiteY0"/>
+                  </a:cxn>
+                  <a:cxn ang="0">
+                    <a:pos x="connsiteX1" y="connsiteY1"/>
+                  </a:cxn>
+                  <a:cxn ang="0">
+                    <a:pos x="connsiteX2" y="connsiteY2"/>
+                  </a:cxn>
+                  <a:cxn ang="0">
+                    <a:pos x="connsiteX3" y="connsiteY3"/>
+                  </a:cxn>
+                  <a:cxn ang="0">
+                    <a:pos x="connsiteX4" y="connsiteY4"/>
+                  </a:cxn>
+                  <a:cxn ang="0">
+                    <a:pos x="connsiteX5" y="connsiteY5"/>
+                  </a:cxn>
+                  <a:cxn ang="0">
+                    <a:pos x="connsiteX6" y="connsiteY6"/>
+                  </a:cxn>
+                  <a:cxn ang="0">
+                    <a:pos x="connsiteX7" y="connsiteY7"/>
+                  </a:cxn>
+                  <a:cxn ang="0">
+                    <a:pos x="connsiteX8" y="connsiteY8"/>
+                  </a:cxn>
+                  <a:cxn ang="0">
+                    <a:pos x="connsiteX9" y="connsiteY9"/>
+                  </a:cxn>
+                  <a:cxn ang="0">
+                    <a:pos x="connsiteX10" y="connsiteY10"/>
+                  </a:cxn>
+                  <a:cxn ang="0">
+                    <a:pos x="connsiteX11" y="connsiteY11"/>
+                  </a:cxn>
+                  <a:cxn ang="0">
+                    <a:pos x="connsiteX12" y="connsiteY12"/>
+                  </a:cxn>
+                  <a:cxn ang="0">
+                    <a:pos x="connsiteX13" y="connsiteY13"/>
+                  </a:cxn>
+                  <a:cxn ang="0">
+                    <a:pos x="connsiteX14" y="connsiteY14"/>
+                  </a:cxn>
+                  <a:cxn ang="0">
+                    <a:pos x="connsiteX15" y="connsiteY15"/>
+                  </a:cxn>
+                </a:cxnLst>
+                <a:rect l="l" t="t" r="r" b="b"/>
+                <a:pathLst>
+                  <a:path w="5249111" h="5236918">
+                    <a:moveTo>
+                      <a:pt x="0" y="0"/>
+                    </a:moveTo>
+                    <a:lnTo>
+                      <a:pt x="5249111" y="0"/>
+                    </a:lnTo>
+                    <a:lnTo>
+                      <a:pt x="5249111" y="5236918"/>
+                    </a:lnTo>
+                    <a:lnTo>
+                      <a:pt x="0" y="5236918"/>
+                    </a:lnTo>
+                    <a:lnTo>
+                      <a:pt x="0" y="0"/>
+                    </a:lnTo>
+                    <a:close/>
+                    <a:moveTo>
+                      <a:pt x="2521335" y="292996"/>
+                    </a:moveTo>
+                    <a:lnTo>
+                      <a:pt x="1999681" y="1981141"/>
+                    </a:lnTo>
+                    <a:lnTo>
+                      <a:pt x="311539" y="1981129"/>
+                    </a:lnTo>
+                    <a:lnTo>
+                      <a:pt x="1677281" y="3024448"/>
+                    </a:lnTo>
+                    <a:lnTo>
+                      <a:pt x="1155606" y="4712586"/>
+                    </a:lnTo>
+                    <a:lnTo>
+                      <a:pt x="2521335" y="3669247"/>
+                    </a:lnTo>
+                    <a:lnTo>
+                      <a:pt x="3887063" y="4712586"/>
+                    </a:lnTo>
+                    <a:lnTo>
+                      <a:pt x="3365388" y="3024448"/>
+                    </a:lnTo>
+                    <a:lnTo>
+                      <a:pt x="4731130" y="1981129"/>
+                    </a:lnTo>
+                    <a:lnTo>
+                      <a:pt x="3042988" y="1981141"/>
+                    </a:lnTo>
+                    <a:lnTo>
+                      <a:pt x="2521335" y="292996"/>
+                    </a:lnTo>
+                    <a:close/>
+                  </a:path>
+                </a:pathLst>
+              </a:custGeom>
+            </p:spPr>
+          </p:pic>
+        </p:grpSp>
       </p:grpSp>
     </p:spTree>
     <p:custDataLst>

</xml_diff>